<commit_message>
edits to presentation for poster
</commit_message>
<xml_diff>
--- a/iv2016slides.pptx
+++ b/iv2016slides.pptx
@@ -5,10 +5,10 @@
     <p:sldMasterId id="2147483648" r:id="rId2"/>
   </p:sldMasterIdLst>
   <p:notesMasterIdLst>
-    <p:notesMasterId r:id="rId17"/>
+    <p:notesMasterId r:id="rId19"/>
   </p:notesMasterIdLst>
   <p:handoutMasterIdLst>
-    <p:handoutMasterId r:id="rId18"/>
+    <p:handoutMasterId r:id="rId20"/>
   </p:handoutMasterIdLst>
   <p:sldIdLst>
     <p:sldId id="256" r:id="rId3"/>
@@ -20,11 +20,13 @@
     <p:sldId id="262" r:id="rId9"/>
     <p:sldId id="267" r:id="rId10"/>
     <p:sldId id="277" r:id="rId11"/>
-    <p:sldId id="270" r:id="rId12"/>
-    <p:sldId id="263" r:id="rId13"/>
-    <p:sldId id="259" r:id="rId14"/>
-    <p:sldId id="319" r:id="rId15"/>
-    <p:sldId id="325" r:id="rId16"/>
+    <p:sldId id="326" r:id="rId12"/>
+    <p:sldId id="270" r:id="rId13"/>
+    <p:sldId id="263" r:id="rId14"/>
+    <p:sldId id="327" r:id="rId15"/>
+    <p:sldId id="259" r:id="rId16"/>
+    <p:sldId id="319" r:id="rId17"/>
+    <p:sldId id="325" r:id="rId18"/>
   </p:sldIdLst>
   <p:sldSz cx="9144000" cy="6858000" type="screen4x3"/>
   <p:notesSz cx="7315200" cy="9601200"/>
@@ -228,7 +230,7 @@
             <a:fld id="{7F49BA32-1066-4DB1-BDBB-24172BC47326}" type="datetimeFigureOut">
               <a:rPr lang="en-US" smtClean="0"/>
               <a:pPr/>
-              <a:t>4/27/2016</a:t>
+              <a:t>4/28/2016</a:t>
             </a:fld>
             <a:endParaRPr lang="en-US"/>
           </a:p>
@@ -395,7 +397,7 @@
             <a:fld id="{6EFAAEFC-76A4-4C3B-8B23-C9B94E8B55F7}" type="datetimeFigureOut">
               <a:rPr lang="en-US" smtClean="0"/>
               <a:pPr/>
-              <a:t>4/27/2016</a:t>
+              <a:t>4/28/2016</a:t>
             </a:fld>
             <a:endParaRPr lang="en-US"/>
           </a:p>
@@ -833,7 +835,7 @@
             <a:fld id="{95735527-E4B0-46E5-A003-55E28C3E5DA9}" type="slidenum">
               <a:rPr lang="en-US" smtClean="0"/>
               <a:pPr/>
-              <a:t>10</a:t>
+              <a:t>11</a:t>
             </a:fld>
             <a:endParaRPr lang="en-US"/>
           </a:p>
@@ -975,7 +977,7 @@
             <a:fld id="{95735527-E4B0-46E5-A003-55E28C3E5DA9}" type="slidenum">
               <a:rPr lang="en-US" smtClean="0"/>
               <a:pPr/>
-              <a:t>11</a:t>
+              <a:t>12</a:t>
             </a:fld>
             <a:endParaRPr lang="en-US"/>
           </a:p>
@@ -1060,7 +1062,7 @@
             <a:fld id="{95735527-E4B0-46E5-A003-55E28C3E5DA9}" type="slidenum">
               <a:rPr lang="en-US" smtClean="0"/>
               <a:pPr/>
-              <a:t>14</a:t>
+              <a:t>16</a:t>
             </a:fld>
             <a:endParaRPr lang="en-US"/>
           </a:p>
@@ -2224,7 +2226,7 @@
             <a:fld id="{E9F2DF85-5102-483E-A1BB-B3F8368E0DB4}" type="datetimeFigureOut">
               <a:rPr lang="en-US" smtClean="0"/>
               <a:pPr/>
-              <a:t>4/27/2016</a:t>
+              <a:t>4/28/2016</a:t>
             </a:fld>
             <a:endParaRPr lang="en-US"/>
           </a:p>
@@ -2401,7 +2403,7 @@
             <a:fld id="{E9F2DF85-5102-483E-A1BB-B3F8368E0DB4}" type="datetimeFigureOut">
               <a:rPr lang="en-US" smtClean="0"/>
               <a:pPr/>
-              <a:t>4/27/2016</a:t>
+              <a:t>4/28/2016</a:t>
             </a:fld>
             <a:endParaRPr lang="en-US"/>
           </a:p>
@@ -2578,7 +2580,7 @@
             <a:fld id="{E9F2DF85-5102-483E-A1BB-B3F8368E0DB4}" type="datetimeFigureOut">
               <a:rPr lang="en-US" smtClean="0"/>
               <a:pPr/>
-              <a:t>4/27/2016</a:t>
+              <a:t>4/28/2016</a:t>
             </a:fld>
             <a:endParaRPr lang="en-US"/>
           </a:p>
@@ -2776,7 +2778,7 @@
             <a:fld id="{E9F2DF85-5102-483E-A1BB-B3F8368E0DB4}" type="datetimeFigureOut">
               <a:rPr lang="en-US" smtClean="0"/>
               <a:pPr/>
-              <a:t>4/27/2016</a:t>
+              <a:t>4/28/2016</a:t>
             </a:fld>
             <a:endParaRPr lang="en-US"/>
           </a:p>
@@ -3019,7 +3021,7 @@
             <a:fld id="{E9F2DF85-5102-483E-A1BB-B3F8368E0DB4}" type="datetimeFigureOut">
               <a:rPr lang="en-US" smtClean="0"/>
               <a:pPr/>
-              <a:t>4/27/2016</a:t>
+              <a:t>4/28/2016</a:t>
             </a:fld>
             <a:endParaRPr lang="en-US"/>
           </a:p>
@@ -3309,7 +3311,7 @@
             <a:fld id="{E9F2DF85-5102-483E-A1BB-B3F8368E0DB4}" type="datetimeFigureOut">
               <a:rPr lang="en-US" smtClean="0"/>
               <a:pPr/>
-              <a:t>4/27/2016</a:t>
+              <a:t>4/28/2016</a:t>
             </a:fld>
             <a:endParaRPr lang="en-US"/>
           </a:p>
@@ -3733,7 +3735,7 @@
             <a:fld id="{E9F2DF85-5102-483E-A1BB-B3F8368E0DB4}" type="datetimeFigureOut">
               <a:rPr lang="en-US" smtClean="0"/>
               <a:pPr/>
-              <a:t>4/27/2016</a:t>
+              <a:t>4/28/2016</a:t>
             </a:fld>
             <a:endParaRPr lang="en-US"/>
           </a:p>
@@ -3853,7 +3855,7 @@
             <a:fld id="{E9F2DF85-5102-483E-A1BB-B3F8368E0DB4}" type="datetimeFigureOut">
               <a:rPr lang="en-US" smtClean="0"/>
               <a:pPr/>
-              <a:t>4/27/2016</a:t>
+              <a:t>4/28/2016</a:t>
             </a:fld>
             <a:endParaRPr lang="en-US"/>
           </a:p>
@@ -3945,7 +3947,7 @@
             <a:fld id="{E9F2DF85-5102-483E-A1BB-B3F8368E0DB4}" type="datetimeFigureOut">
               <a:rPr lang="en-US" smtClean="0"/>
               <a:pPr/>
-              <a:t>4/27/2016</a:t>
+              <a:t>4/28/2016</a:t>
             </a:fld>
             <a:endParaRPr lang="en-US"/>
           </a:p>
@@ -4219,7 +4221,7 @@
             <a:fld id="{E9F2DF85-5102-483E-A1BB-B3F8368E0DB4}" type="datetimeFigureOut">
               <a:rPr lang="en-US" smtClean="0"/>
               <a:pPr/>
-              <a:t>4/27/2016</a:t>
+              <a:t>4/28/2016</a:t>
             </a:fld>
             <a:endParaRPr lang="en-US"/>
           </a:p>
@@ -4472,7 +4474,7 @@
             <a:fld id="{E9F2DF85-5102-483E-A1BB-B3F8368E0DB4}" type="datetimeFigureOut">
               <a:rPr lang="en-US" smtClean="0"/>
               <a:pPr/>
-              <a:t>4/27/2016</a:t>
+              <a:t>4/28/2016</a:t>
             </a:fld>
             <a:endParaRPr lang="en-US"/>
           </a:p>
@@ -4682,7 +4684,7 @@
             <a:fld id="{E9F2DF85-5102-483E-A1BB-B3F8368E0DB4}" type="datetimeFigureOut">
               <a:rPr lang="en-US" smtClean="0"/>
               <a:pPr/>
-              <a:t>4/27/2016</a:t>
+              <a:t>4/28/2016</a:t>
             </a:fld>
             <a:endParaRPr lang="en-US"/>
           </a:p>
@@ -5261,9 +5263,436 @@
           <a:lstStyle/>
           <a:p>
             <a:r>
+              <a:rPr lang="en-US" dirty="0" smtClean="0"/>
+              <a:t>Pedestrian Reactivity</a:t>
+            </a:r>
+            <a:endParaRPr lang="en-US" dirty="0"/>
+          </a:p>
+        </p:txBody>
+      </p:sp>
+      <p:sp>
+        <p:nvSpPr>
+          <p:cNvPr id="4" name="Content Placeholder 2"/>
+          <p:cNvSpPr txBox="1">
+            <a:spLocks/>
+          </p:cNvSpPr>
+          <p:nvPr/>
+        </p:nvSpPr>
+        <p:spPr>
+          <a:xfrm>
+            <a:off x="457200" y="4343400"/>
+            <a:ext cx="8229600" cy="463422"/>
+          </a:xfrm>
+          <a:prstGeom prst="rect">
+            <a:avLst/>
+          </a:prstGeom>
+        </p:spPr>
+        <p:txBody>
+          <a:bodyPr vert="horz" lIns="91432" tIns="45716" rIns="91432" bIns="45716" rtlCol="0">
+            <a:normAutofit/>
+          </a:bodyPr>
+          <a:lstStyle>
+            <a:lvl1pPr marL="342870" indent="-342870" algn="l" defTabSz="914318" rtl="0" eaLnBrk="1" latinLnBrk="0" hangingPunct="1">
+              <a:spcBef>
+                <a:spcPts val="0"/>
+              </a:spcBef>
+              <a:buFont typeface="Arial" pitchFamily="34" charset="0"/>
+              <a:buChar char="•"/>
+              <a:defRPr sz="2400" kern="1200">
+                <a:solidFill>
+                  <a:schemeClr val="tx1"/>
+                </a:solidFill>
+                <a:latin typeface="+mn-lt"/>
+                <a:ea typeface="+mn-ea"/>
+                <a:cs typeface="+mn-cs"/>
+              </a:defRPr>
+            </a:lvl1pPr>
+            <a:lvl2pPr marL="742883" indent="-285724" algn="l" defTabSz="914318" rtl="0" eaLnBrk="1" latinLnBrk="0" hangingPunct="1">
+              <a:spcBef>
+                <a:spcPts val="200"/>
+              </a:spcBef>
+              <a:buFont typeface="Arial" pitchFamily="34" charset="0"/>
+              <a:buChar char="–"/>
+              <a:defRPr sz="2200" kern="1200">
+                <a:solidFill>
+                  <a:schemeClr val="tx1"/>
+                </a:solidFill>
+                <a:latin typeface="+mn-lt"/>
+                <a:ea typeface="+mn-ea"/>
+                <a:cs typeface="+mn-cs"/>
+              </a:defRPr>
+            </a:lvl2pPr>
+            <a:lvl3pPr marL="1142898" indent="-228580" algn="l" defTabSz="914318" rtl="0" eaLnBrk="1" latinLnBrk="0" hangingPunct="1">
+              <a:spcBef>
+                <a:spcPts val="0"/>
+              </a:spcBef>
+              <a:buFont typeface="Arial" pitchFamily="34" charset="0"/>
+              <a:buChar char="•"/>
+              <a:defRPr sz="2200" kern="1200">
+                <a:solidFill>
+                  <a:schemeClr val="tx1"/>
+                </a:solidFill>
+                <a:latin typeface="+mn-lt"/>
+                <a:ea typeface="+mn-ea"/>
+                <a:cs typeface="+mn-cs"/>
+              </a:defRPr>
+            </a:lvl3pPr>
+            <a:lvl4pPr marL="1600057" indent="-228580" algn="l" defTabSz="914318" rtl="0" eaLnBrk="1" latinLnBrk="0" hangingPunct="1">
+              <a:spcBef>
+                <a:spcPts val="200"/>
+              </a:spcBef>
+              <a:buFont typeface="Arial" pitchFamily="34" charset="0"/>
+              <a:buChar char="–"/>
+              <a:defRPr sz="2000" kern="1200">
+                <a:solidFill>
+                  <a:schemeClr val="tx1"/>
+                </a:solidFill>
+                <a:latin typeface="+mn-lt"/>
+                <a:ea typeface="+mn-ea"/>
+                <a:cs typeface="+mn-cs"/>
+              </a:defRPr>
+            </a:lvl4pPr>
+            <a:lvl5pPr marL="2057217" indent="-228580" algn="l" defTabSz="914318" rtl="0" eaLnBrk="1" latinLnBrk="0" hangingPunct="1">
+              <a:spcBef>
+                <a:spcPts val="200"/>
+              </a:spcBef>
+              <a:buFont typeface="Arial" pitchFamily="34" charset="0"/>
+              <a:buChar char="»"/>
+              <a:defRPr sz="2000" kern="1200">
+                <a:solidFill>
+                  <a:schemeClr val="tx1"/>
+                </a:solidFill>
+                <a:latin typeface="+mn-lt"/>
+                <a:ea typeface="+mn-ea"/>
+                <a:cs typeface="+mn-cs"/>
+              </a:defRPr>
+            </a:lvl5pPr>
+            <a:lvl6pPr marL="2514376" indent="-228580" algn="l" defTabSz="914318" rtl="0" eaLnBrk="1" latinLnBrk="0" hangingPunct="1">
+              <a:spcBef>
+                <a:spcPct val="20000"/>
+              </a:spcBef>
+              <a:buFont typeface="Arial" pitchFamily="34" charset="0"/>
+              <a:buChar char="•"/>
+              <a:defRPr sz="2000" kern="1200">
+                <a:solidFill>
+                  <a:schemeClr val="tx1"/>
+                </a:solidFill>
+                <a:latin typeface="+mn-lt"/>
+                <a:ea typeface="+mn-ea"/>
+                <a:cs typeface="+mn-cs"/>
+              </a:defRPr>
+            </a:lvl6pPr>
+            <a:lvl7pPr marL="2971535" indent="-228580" algn="l" defTabSz="914318" rtl="0" eaLnBrk="1" latinLnBrk="0" hangingPunct="1">
+              <a:spcBef>
+                <a:spcPct val="20000"/>
+              </a:spcBef>
+              <a:buFont typeface="Arial" pitchFamily="34" charset="0"/>
+              <a:buChar char="•"/>
+              <a:defRPr sz="2000" kern="1200">
+                <a:solidFill>
+                  <a:schemeClr val="tx1"/>
+                </a:solidFill>
+                <a:latin typeface="+mn-lt"/>
+                <a:ea typeface="+mn-ea"/>
+                <a:cs typeface="+mn-cs"/>
+              </a:defRPr>
+            </a:lvl7pPr>
+            <a:lvl8pPr marL="3428695" indent="-228580" algn="l" defTabSz="914318" rtl="0" eaLnBrk="1" latinLnBrk="0" hangingPunct="1">
+              <a:spcBef>
+                <a:spcPct val="20000"/>
+              </a:spcBef>
+              <a:buFont typeface="Arial" pitchFamily="34" charset="0"/>
+              <a:buChar char="•"/>
+              <a:defRPr sz="2000" kern="1200">
+                <a:solidFill>
+                  <a:schemeClr val="tx1"/>
+                </a:solidFill>
+                <a:latin typeface="+mn-lt"/>
+                <a:ea typeface="+mn-ea"/>
+                <a:cs typeface="+mn-cs"/>
+              </a:defRPr>
+            </a:lvl8pPr>
+            <a:lvl9pPr marL="3885854" indent="-228580" algn="l" defTabSz="914318" rtl="0" eaLnBrk="1" latinLnBrk="0" hangingPunct="1">
+              <a:spcBef>
+                <a:spcPct val="20000"/>
+              </a:spcBef>
+              <a:buFont typeface="Arial" pitchFamily="34" charset="0"/>
+              <a:buChar char="•"/>
+              <a:defRPr sz="2000" kern="1200">
+                <a:solidFill>
+                  <a:schemeClr val="tx1"/>
+                </a:solidFill>
+                <a:latin typeface="+mn-lt"/>
+                <a:ea typeface="+mn-ea"/>
+                <a:cs typeface="+mn-cs"/>
+              </a:defRPr>
+            </a:lvl9pPr>
+          </a:lstStyle>
+          <a:p>
+            <a:r>
+              <a:rPr lang="en-US" sz="2000" dirty="0" smtClean="0"/>
+              <a:t>Revise trajectory if pedestrian moves outside </a:t>
+            </a:r>
+            <a:r>
+              <a:rPr lang="en-US" sz="2000" dirty="0" err="1" smtClean="0"/>
+              <a:t>replan</a:t>
+            </a:r>
+            <a:r>
+              <a:rPr lang="en-US" sz="2000" dirty="0" smtClean="0"/>
+              <a:t> buffer</a:t>
+            </a:r>
+          </a:p>
+          <a:p>
+            <a:endParaRPr lang="en-US" sz="2000" dirty="0" smtClean="0"/>
+          </a:p>
+          <a:p>
+            <a:endParaRPr lang="en-US" sz="2000" dirty="0" smtClean="0"/>
+          </a:p>
+          <a:p>
+            <a:endParaRPr lang="en-US" sz="2000" dirty="0" smtClean="0"/>
+          </a:p>
+          <a:p>
+            <a:endParaRPr lang="en-US" sz="2000" dirty="0" smtClean="0"/>
+          </a:p>
+          <a:p>
+            <a:endParaRPr lang="en-US" sz="2000" dirty="0" smtClean="0"/>
+          </a:p>
+          <a:p>
+            <a:endParaRPr lang="en-US" sz="2000" dirty="0" smtClean="0"/>
+          </a:p>
+          <a:p>
+            <a:endParaRPr lang="en-US" sz="2000" dirty="0" smtClean="0"/>
+          </a:p>
+          <a:p>
+            <a:pPr>
+              <a:buFont typeface="Arial" pitchFamily="34" charset="0"/>
+              <a:buNone/>
+            </a:pPr>
+            <a:endParaRPr lang="en-US" sz="2000" dirty="0" smtClean="0"/>
+          </a:p>
+          <a:p>
+            <a:pPr>
+              <a:buFont typeface="Arial" pitchFamily="34" charset="0"/>
+              <a:buNone/>
+            </a:pPr>
+            <a:endParaRPr lang="en-US" sz="2000" dirty="0"/>
+          </a:p>
+        </p:txBody>
+      </p:sp>
+      <p:grpSp>
+        <p:nvGrpSpPr>
+          <p:cNvPr id="5" name="Group 4"/>
+          <p:cNvGrpSpPr/>
+          <p:nvPr/>
+        </p:nvGrpSpPr>
+        <p:grpSpPr>
+          <a:xfrm>
+            <a:off x="761067" y="1514977"/>
+            <a:ext cx="6553200" cy="2057400"/>
+            <a:chOff x="838200" y="990600"/>
+            <a:chExt cx="6172200" cy="1783080"/>
+          </a:xfrm>
+        </p:grpSpPr>
+        <p:grpSp>
+          <p:nvGrpSpPr>
+            <p:cNvPr id="6" name="Group 7"/>
+            <p:cNvGrpSpPr/>
+            <p:nvPr/>
+          </p:nvGrpSpPr>
+          <p:grpSpPr>
+            <a:xfrm>
+              <a:off x="838200" y="990600"/>
+              <a:ext cx="6019800" cy="1719077"/>
+              <a:chOff x="990600" y="1447800"/>
+              <a:chExt cx="6019800" cy="1719077"/>
+            </a:xfrm>
+          </p:grpSpPr>
+          <p:pic>
+            <p:nvPicPr>
+              <p:cNvPr id="8" name="Picture 5"/>
+              <p:cNvPicPr>
+                <a:picLocks noChangeAspect="1" noChangeArrowheads="1"/>
+              </p:cNvPicPr>
+              <p:nvPr/>
+            </p:nvPicPr>
+            <p:blipFill>
+              <a:blip r:embed="rId2" cstate="print"/>
+              <a:srcRect/>
+              <a:stretch>
+                <a:fillRect/>
+              </a:stretch>
+            </p:blipFill>
+            <p:spPr bwMode="auto">
+              <a:xfrm>
+                <a:off x="1295400" y="1600200"/>
+                <a:ext cx="5715000" cy="1566677"/>
+              </a:xfrm>
+              <a:prstGeom prst="rect">
+                <a:avLst/>
+              </a:prstGeom>
+              <a:noFill/>
+              <a:ln w="9525">
+                <a:noFill/>
+                <a:miter lim="800000"/>
+                <a:headEnd/>
+                <a:tailEnd/>
+              </a:ln>
+            </p:spPr>
+          </p:pic>
+          <p:sp>
+            <p:nvSpPr>
+              <p:cNvPr id="9" name="Rectangle 8"/>
+              <p:cNvSpPr/>
+              <p:nvPr/>
+            </p:nvSpPr>
+            <p:spPr>
+              <a:xfrm>
+                <a:off x="990600" y="1447800"/>
+                <a:ext cx="914400" cy="1717040"/>
+              </a:xfrm>
+              <a:prstGeom prst="rect">
+                <a:avLst/>
+              </a:prstGeom>
+              <a:solidFill>
+                <a:schemeClr val="bg1"/>
+              </a:solidFill>
+              <a:ln>
+                <a:noFill/>
+              </a:ln>
+            </p:spPr>
+            <p:style>
+              <a:lnRef idx="2">
+                <a:schemeClr val="accent1">
+                  <a:shade val="50000"/>
+                </a:schemeClr>
+              </a:lnRef>
+              <a:fillRef idx="1">
+                <a:schemeClr val="accent1"/>
+              </a:fillRef>
+              <a:effectRef idx="0">
+                <a:schemeClr val="accent1"/>
+              </a:effectRef>
+              <a:fontRef idx="minor">
+                <a:schemeClr val="lt1"/>
+              </a:fontRef>
+            </p:style>
+            <p:txBody>
+              <a:bodyPr rtlCol="0" anchor="ctr"/>
+              <a:lstStyle/>
+              <a:p>
+                <a:pPr algn="ctr"/>
+                <a:endParaRPr lang="en-US"/>
+              </a:p>
+            </p:txBody>
+          </p:sp>
+        </p:grpSp>
+        <p:sp>
+          <p:nvSpPr>
+            <p:cNvPr id="7" name="Rectangle 6"/>
+            <p:cNvSpPr/>
+            <p:nvPr/>
+          </p:nvSpPr>
+          <p:spPr>
+            <a:xfrm>
+              <a:off x="1600200" y="2545080"/>
+              <a:ext cx="5410200" cy="228600"/>
+            </a:xfrm>
+            <a:prstGeom prst="rect">
+              <a:avLst/>
+            </a:prstGeom>
+            <a:solidFill>
+              <a:schemeClr val="bg1"/>
+            </a:solidFill>
+            <a:ln>
+              <a:noFill/>
+            </a:ln>
+          </p:spPr>
+          <p:style>
+            <a:lnRef idx="2">
+              <a:schemeClr val="accent1">
+                <a:shade val="50000"/>
+              </a:schemeClr>
+            </a:lnRef>
+            <a:fillRef idx="1">
+              <a:schemeClr val="accent1"/>
+            </a:fillRef>
+            <a:effectRef idx="0">
+              <a:schemeClr val="accent1"/>
+            </a:effectRef>
+            <a:fontRef idx="minor">
+              <a:schemeClr val="lt1"/>
+            </a:fontRef>
+          </p:style>
+          <p:txBody>
+            <a:bodyPr rtlCol="0" anchor="ctr"/>
+            <a:lstStyle/>
+            <a:p>
+              <a:pPr algn="ctr"/>
+              <a:endParaRPr lang="en-US"/>
+            </a:p>
+          </p:txBody>
+        </p:sp>
+      </p:grpSp>
+    </p:spTree>
+    <p:extLst>
+      <p:ext uri="{BB962C8B-B14F-4D97-AF65-F5344CB8AC3E}">
+        <p14:creationId xmlns:p14="http://schemas.microsoft.com/office/powerpoint/2010/main" val="1077403194"/>
+      </p:ext>
+    </p:extLst>
+  </p:cSld>
+  <p:clrMapOvr>
+    <a:masterClrMapping/>
+  </p:clrMapOvr>
+</p:sld>
+</file>
+
+<file path=ppt/slides/slide11.xml><?xml version="1.0" encoding="utf-8"?>
+<p:sld xmlns:a="http://schemas.openxmlformats.org/drawingml/2006/main" xmlns:r="http://schemas.openxmlformats.org/officeDocument/2006/relationships" xmlns:p="http://schemas.openxmlformats.org/presentationml/2006/main">
+  <p:cSld>
+    <p:spTree>
+      <p:nvGrpSpPr>
+        <p:cNvPr id="1" name=""/>
+        <p:cNvGrpSpPr/>
+        <p:nvPr/>
+      </p:nvGrpSpPr>
+      <p:grpSpPr>
+        <a:xfrm>
+          <a:off x="0" y="0"/>
+          <a:ext cx="0" cy="0"/>
+          <a:chOff x="0" y="0"/>
+          <a:chExt cx="0" cy="0"/>
+        </a:xfrm>
+      </p:grpSpPr>
+      <p:sp>
+        <p:nvSpPr>
+          <p:cNvPr id="2" name="Title 1"/>
+          <p:cNvSpPr>
+            <a:spLocks noGrp="1"/>
+          </p:cNvSpPr>
+          <p:nvPr>
+            <p:ph type="title"/>
+          </p:nvPr>
+        </p:nvSpPr>
+        <p:spPr/>
+        <p:txBody>
+          <a:bodyPr>
+            <a:normAutofit fontScale="90000"/>
+          </a:bodyPr>
+          <a:lstStyle/>
+          <a:p>
+            <a:r>
+              <a:rPr lang="en-US" dirty="0" smtClean="0"/>
+              <a:t>Return to Normal </a:t>
+            </a:r>
+            <a:r>
               <a:rPr lang="en-US" dirty="0"/>
-              <a:t>Back to normal driving</a:t>
-            </a:r>
+              <a:t>D</a:t>
+            </a:r>
+            <a:r>
+              <a:rPr lang="en-US" dirty="0" smtClean="0"/>
+              <a:t>riving</a:t>
+            </a:r>
+            <a:endParaRPr lang="en-US" dirty="0"/>
           </a:p>
         </p:txBody>
       </p:sp>
@@ -5839,135 +6268,6 @@
 </p:sld>
 </file>
 
-<file path=ppt/slides/slide11.xml><?xml version="1.0" encoding="utf-8"?>
-<p:sld xmlns:a="http://schemas.openxmlformats.org/drawingml/2006/main" xmlns:r="http://schemas.openxmlformats.org/officeDocument/2006/relationships" xmlns:p="http://schemas.openxmlformats.org/presentationml/2006/main">
-  <p:cSld>
-    <p:spTree>
-      <p:nvGrpSpPr>
-        <p:cNvPr id="1" name=""/>
-        <p:cNvGrpSpPr/>
-        <p:nvPr/>
-      </p:nvGrpSpPr>
-      <p:grpSpPr>
-        <a:xfrm>
-          <a:off x="0" y="0"/>
-          <a:ext cx="0" cy="0"/>
-          <a:chOff x="0" y="0"/>
-          <a:chExt cx="0" cy="0"/>
-        </a:xfrm>
-      </p:grpSpPr>
-      <p:sp>
-        <p:nvSpPr>
-          <p:cNvPr id="2" name="Title 1"/>
-          <p:cNvSpPr>
-            <a:spLocks noGrp="1"/>
-          </p:cNvSpPr>
-          <p:nvPr>
-            <p:ph type="title"/>
-          </p:nvPr>
-        </p:nvSpPr>
-        <p:spPr/>
-        <p:txBody>
-          <a:bodyPr>
-            <a:normAutofit fontScale="90000"/>
-          </a:bodyPr>
-          <a:lstStyle/>
-          <a:p>
-            <a:r>
-              <a:rPr lang="en-US" dirty="0"/>
-              <a:t>Implementation</a:t>
-            </a:r>
-          </a:p>
-        </p:txBody>
-      </p:sp>
-      <p:sp>
-        <p:nvSpPr>
-          <p:cNvPr id="3" name="Content Placeholder 2"/>
-          <p:cNvSpPr>
-            <a:spLocks noGrp="1"/>
-          </p:cNvSpPr>
-          <p:nvPr>
-            <p:ph idx="1"/>
-          </p:nvPr>
-        </p:nvSpPr>
-        <p:spPr>
-          <a:xfrm>
-            <a:off x="457200" y="990600"/>
-            <a:ext cx="8382000" cy="5257800"/>
-          </a:xfrm>
-        </p:spPr>
-        <p:txBody>
-          <a:bodyPr>
-            <a:normAutofit/>
-          </a:bodyPr>
-          <a:lstStyle/>
-          <a:p>
-            <a:r>
-              <a:rPr lang="en-US" sz="2000" dirty="0"/>
-              <a:t>System tested 100+ hours</a:t>
-            </a:r>
-          </a:p>
-          <a:p>
-            <a:r>
-              <a:rPr lang="en-US" sz="2000" dirty="0"/>
-              <a:t>Planner online operation @ 10 Hz</a:t>
-            </a:r>
-          </a:p>
-          <a:p>
-            <a:r>
-              <a:rPr lang="en-US" sz="2000" dirty="0"/>
-              <a:t>Our planner handled corner cases gracefully</a:t>
-            </a:r>
-          </a:p>
-          <a:p>
-            <a:r>
-              <a:rPr lang="en-US" sz="2000" dirty="0"/>
-              <a:t>Demo worked 35 times in closed course with no disengagements</a:t>
-            </a:r>
-          </a:p>
-          <a:p>
-            <a:pPr>
-              <a:buNone/>
-            </a:pPr>
-            <a:endParaRPr lang="en-US" sz="2000" dirty="0"/>
-          </a:p>
-          <a:p>
-            <a:pPr>
-              <a:buNone/>
-            </a:pPr>
-            <a:r>
-              <a:rPr lang="en-US" sz="2000" b="1" dirty="0"/>
-              <a:t>Extensions</a:t>
-            </a:r>
-          </a:p>
-          <a:p>
-            <a:r>
-              <a:rPr lang="en-US" sz="2000" dirty="0"/>
-              <a:t>Support self-intersecting, overlapping paths</a:t>
-            </a:r>
-          </a:p>
-          <a:p>
-            <a:r>
-              <a:rPr lang="en-US" sz="2000" dirty="0"/>
-              <a:t>Perceive and stop for red-lights</a:t>
-            </a:r>
-          </a:p>
-          <a:p>
-            <a:r>
-              <a:rPr lang="en-US" sz="2000" dirty="0"/>
-              <a:t>Handle other roadway traffic, change lanes</a:t>
-            </a:r>
-          </a:p>
-        </p:txBody>
-      </p:sp>
-    </p:spTree>
-  </p:cSld>
-  <p:clrMapOvr>
-    <a:masterClrMapping/>
-  </p:clrMapOvr>
-</p:sld>
-</file>
-
 <file path=ppt/slides/slide12.xml><?xml version="1.0" encoding="utf-8"?>
 <p:sld xmlns:a="http://schemas.openxmlformats.org/drawingml/2006/main" xmlns:r="http://schemas.openxmlformats.org/officeDocument/2006/relationships" xmlns:p="http://schemas.openxmlformats.org/presentationml/2006/main">
   <p:cSld>
@@ -6004,7 +6304,7 @@
           <a:p>
             <a:r>
               <a:rPr lang="en-US" dirty="0"/>
-              <a:t>Summary</a:t>
+              <a:t>Implementation</a:t>
             </a:r>
           </a:p>
         </p:txBody>
@@ -6019,7 +6319,12 @@
             <p:ph idx="1"/>
           </p:nvPr>
         </p:nvSpPr>
-        <p:spPr/>
+        <p:spPr>
+          <a:xfrm>
+            <a:off x="457200" y="990600"/>
+            <a:ext cx="8382000" cy="5257800"/>
+          </a:xfrm>
+        </p:spPr>
         <p:txBody>
           <a:bodyPr>
             <a:normAutofit/>
@@ -6027,44 +6332,26 @@
           <a:lstStyle/>
           <a:p>
             <a:r>
-              <a:rPr lang="en-US" sz="2000" dirty="0" smtClean="0"/>
-              <a:t>We built a system for trajectory </a:t>
-            </a:r>
-            <a:r>
-              <a:rPr lang="en-US" sz="2000" dirty="0" smtClean="0"/>
-              <a:t>planning</a:t>
-            </a:r>
-          </a:p>
-          <a:p>
-            <a:pPr lvl="1"/>
-            <a:r>
-              <a:rPr lang="en-US" sz="1800" dirty="0" smtClean="0"/>
-              <a:t>Demonstrated use in Level II autonomy framework</a:t>
-            </a:r>
-            <a:endParaRPr lang="en-US" sz="1800" dirty="0" smtClean="0"/>
-          </a:p>
-          <a:p>
-            <a:pPr lvl="1"/>
-            <a:r>
-              <a:rPr lang="en-US" sz="1800" dirty="0" smtClean="0"/>
-              <a:t>That is reactive to pedestrians</a:t>
-            </a:r>
-          </a:p>
-          <a:p>
-            <a:pPr lvl="1"/>
-            <a:r>
-              <a:rPr lang="en-US" sz="1800" dirty="0" smtClean="0"/>
-              <a:t>Limits jerk, velocity and acceleration</a:t>
-            </a:r>
-          </a:p>
-          <a:p>
-            <a:pPr lvl="1"/>
-            <a:endParaRPr lang="en-US" sz="1800" dirty="0" smtClean="0"/>
-          </a:p>
-          <a:p>
-            <a:r>
-              <a:rPr lang="en-US" sz="2000" dirty="0" smtClean="0"/>
-              <a:t>System has been tested with over 100 hours of testing</a:t>
+              <a:rPr lang="en-US" sz="2000" dirty="0"/>
+              <a:t>System tested 100+ hours</a:t>
+            </a:r>
+          </a:p>
+          <a:p>
+            <a:r>
+              <a:rPr lang="en-US" sz="2000" dirty="0"/>
+              <a:t>Planner online operation @ 10 Hz</a:t>
+            </a:r>
+          </a:p>
+          <a:p>
+            <a:r>
+              <a:rPr lang="en-US" sz="2000" dirty="0"/>
+              <a:t>Our planner handled corner cases gracefully</a:t>
+            </a:r>
+          </a:p>
+          <a:p>
+            <a:r>
+              <a:rPr lang="en-US" sz="2000" dirty="0"/>
+              <a:t>Demo worked 35 times in closed course with no disengagements</a:t>
             </a:r>
           </a:p>
           <a:p>
@@ -6074,7 +6361,31 @@
             <a:endParaRPr lang="en-US" sz="2000" dirty="0"/>
           </a:p>
           <a:p>
-            <a:endParaRPr lang="en-US" sz="2000" dirty="0"/>
+            <a:pPr>
+              <a:buNone/>
+            </a:pPr>
+            <a:r>
+              <a:rPr lang="en-US" sz="2000" b="1" dirty="0"/>
+              <a:t>Extensions</a:t>
+            </a:r>
+          </a:p>
+          <a:p>
+            <a:r>
+              <a:rPr lang="en-US" sz="2000" dirty="0"/>
+              <a:t>Support self-intersecting, overlapping paths</a:t>
+            </a:r>
+          </a:p>
+          <a:p>
+            <a:r>
+              <a:rPr lang="en-US" sz="2000" dirty="0"/>
+              <a:t>Perceive and stop for red-lights</a:t>
+            </a:r>
+          </a:p>
+          <a:p>
+            <a:r>
+              <a:rPr lang="en-US" sz="2000" dirty="0"/>
+              <a:t>Handle other roadway traffic, change lanes</a:t>
+            </a:r>
           </a:p>
         </p:txBody>
       </p:sp>
@@ -6120,7 +6431,94 @@
           </a:bodyPr>
           <a:lstStyle/>
           <a:p>
-            <a:endParaRPr lang="en-US"/>
+            <a:r>
+              <a:rPr lang="en-US" dirty="0" smtClean="0"/>
+              <a:t>Implementation</a:t>
+            </a:r>
+            <a:endParaRPr lang="en-US" dirty="0"/>
+          </a:p>
+        </p:txBody>
+      </p:sp>
+      <p:pic>
+        <p:nvPicPr>
+          <p:cNvPr id="9" name="Content Placeholder 8"/>
+          <p:cNvPicPr>
+            <a:picLocks noGrp="1" noChangeAspect="1"/>
+          </p:cNvPicPr>
+          <p:nvPr>
+            <p:ph idx="1"/>
+          </p:nvPr>
+        </p:nvPicPr>
+        <p:blipFill>
+          <a:blip r:embed="rId2">
+            <a:extLst>
+              <a:ext uri="{28A0092B-C50C-407E-A947-70E740481C1C}">
+                <a14:useLocalDpi xmlns:a14="http://schemas.microsoft.com/office/drawing/2010/main" val="0"/>
+              </a:ext>
+            </a:extLst>
+          </a:blip>
+          <a:stretch>
+            <a:fillRect/>
+          </a:stretch>
+        </p:blipFill>
+        <p:spPr>
+          <a:xfrm>
+            <a:off x="1066800" y="990600"/>
+            <a:ext cx="7010400" cy="5257800"/>
+          </a:xfrm>
+        </p:spPr>
+      </p:pic>
+    </p:spTree>
+    <p:extLst>
+      <p:ext uri="{BB962C8B-B14F-4D97-AF65-F5344CB8AC3E}">
+        <p14:creationId xmlns:p14="http://schemas.microsoft.com/office/powerpoint/2010/main" val="3640546272"/>
+      </p:ext>
+    </p:extLst>
+  </p:cSld>
+  <p:clrMapOvr>
+    <a:masterClrMapping/>
+  </p:clrMapOvr>
+</p:sld>
+</file>
+
+<file path=ppt/slides/slide14.xml><?xml version="1.0" encoding="utf-8"?>
+<p:sld xmlns:a="http://schemas.openxmlformats.org/drawingml/2006/main" xmlns:r="http://schemas.openxmlformats.org/officeDocument/2006/relationships" xmlns:p="http://schemas.openxmlformats.org/presentationml/2006/main">
+  <p:cSld>
+    <p:spTree>
+      <p:nvGrpSpPr>
+        <p:cNvPr id="1" name=""/>
+        <p:cNvGrpSpPr/>
+        <p:nvPr/>
+      </p:nvGrpSpPr>
+      <p:grpSpPr>
+        <a:xfrm>
+          <a:off x="0" y="0"/>
+          <a:ext cx="0" cy="0"/>
+          <a:chOff x="0" y="0"/>
+          <a:chExt cx="0" cy="0"/>
+        </a:xfrm>
+      </p:grpSpPr>
+      <p:sp>
+        <p:nvSpPr>
+          <p:cNvPr id="2" name="Title 1"/>
+          <p:cNvSpPr>
+            <a:spLocks noGrp="1"/>
+          </p:cNvSpPr>
+          <p:nvPr>
+            <p:ph type="title"/>
+          </p:nvPr>
+        </p:nvSpPr>
+        <p:spPr/>
+        <p:txBody>
+          <a:bodyPr>
+            <a:normAutofit fontScale="90000"/>
+          </a:bodyPr>
+          <a:lstStyle/>
+          <a:p>
+            <a:r>
+              <a:rPr lang="en-US" dirty="0"/>
+              <a:t>Summary</a:t>
+            </a:r>
           </a:p>
         </p:txBody>
       </p:sp>
@@ -6136,36 +6534,55 @@
         </p:nvSpPr>
         <p:spPr/>
         <p:txBody>
-          <a:bodyPr/>
-          <a:lstStyle/>
-          <a:p>
-            <a:endParaRPr lang="en-US" dirty="0"/>
-          </a:p>
-          <a:p>
-            <a:endParaRPr lang="en-US" dirty="0"/>
-          </a:p>
-          <a:p>
-            <a:endParaRPr lang="en-US" dirty="0"/>
-          </a:p>
-          <a:p>
-            <a:endParaRPr lang="en-US" dirty="0"/>
-          </a:p>
-          <a:p>
-            <a:endParaRPr lang="en-US" dirty="0"/>
+          <a:bodyPr>
+            <a:normAutofit/>
+          </a:bodyPr>
+          <a:lstStyle/>
+          <a:p>
+            <a:r>
+              <a:rPr lang="en-US" sz="2000" dirty="0" smtClean="0"/>
+              <a:t>We built a system for trajectory planning</a:t>
+            </a:r>
+          </a:p>
+          <a:p>
+            <a:pPr lvl="1"/>
+            <a:r>
+              <a:rPr lang="en-US" sz="1800" dirty="0" smtClean="0"/>
+              <a:t>Demonstrated use in Level II autonomy framework</a:t>
+            </a:r>
+          </a:p>
+          <a:p>
+            <a:pPr lvl="1"/>
+            <a:r>
+              <a:rPr lang="en-US" sz="1800" dirty="0" smtClean="0"/>
+              <a:t>That is reactive to pedestrians</a:t>
+            </a:r>
+          </a:p>
+          <a:p>
+            <a:pPr lvl="1"/>
+            <a:r>
+              <a:rPr lang="en-US" sz="1800" dirty="0" smtClean="0"/>
+              <a:t>Limits jerk, velocity and acceleration</a:t>
+            </a:r>
+          </a:p>
+          <a:p>
+            <a:pPr lvl="1"/>
+            <a:endParaRPr lang="en-US" sz="1800" dirty="0" smtClean="0"/>
+          </a:p>
+          <a:p>
+            <a:r>
+              <a:rPr lang="en-US" sz="2000" dirty="0" smtClean="0"/>
+              <a:t>System has been tested with over 100 hours of testing</a:t>
+            </a:r>
           </a:p>
           <a:p>
             <a:pPr>
               <a:buNone/>
             </a:pPr>
-            <a:r>
-              <a:rPr lang="en-US" dirty="0"/>
-              <a:t>			</a:t>
-            </a:r>
-            <a:r>
-              <a:rPr lang="en-US" sz="3200" dirty="0"/>
-              <a:t>	Questions?</a:t>
-            </a:r>
-            <a:endParaRPr lang="en-US" dirty="0"/>
+            <a:endParaRPr lang="en-US" sz="2000" dirty="0"/>
+          </a:p>
+          <a:p>
+            <a:endParaRPr lang="en-US" sz="2000" dirty="0"/>
           </a:p>
         </p:txBody>
       </p:sp>
@@ -6177,7 +6594,98 @@
 </p:sld>
 </file>
 
-<file path=ppt/slides/slide14.xml><?xml version="1.0" encoding="utf-8"?>
+<file path=ppt/slides/slide15.xml><?xml version="1.0" encoding="utf-8"?>
+<p:sld xmlns:a="http://schemas.openxmlformats.org/drawingml/2006/main" xmlns:r="http://schemas.openxmlformats.org/officeDocument/2006/relationships" xmlns:p="http://schemas.openxmlformats.org/presentationml/2006/main">
+  <p:cSld>
+    <p:spTree>
+      <p:nvGrpSpPr>
+        <p:cNvPr id="1" name=""/>
+        <p:cNvGrpSpPr/>
+        <p:nvPr/>
+      </p:nvGrpSpPr>
+      <p:grpSpPr>
+        <a:xfrm>
+          <a:off x="0" y="0"/>
+          <a:ext cx="0" cy="0"/>
+          <a:chOff x="0" y="0"/>
+          <a:chExt cx="0" cy="0"/>
+        </a:xfrm>
+      </p:grpSpPr>
+      <p:sp>
+        <p:nvSpPr>
+          <p:cNvPr id="2" name="Title 1"/>
+          <p:cNvSpPr>
+            <a:spLocks noGrp="1"/>
+          </p:cNvSpPr>
+          <p:nvPr>
+            <p:ph type="title"/>
+          </p:nvPr>
+        </p:nvSpPr>
+        <p:spPr/>
+        <p:txBody>
+          <a:bodyPr>
+            <a:normAutofit fontScale="90000"/>
+          </a:bodyPr>
+          <a:lstStyle/>
+          <a:p>
+            <a:endParaRPr lang="en-US"/>
+          </a:p>
+        </p:txBody>
+      </p:sp>
+      <p:sp>
+        <p:nvSpPr>
+          <p:cNvPr id="3" name="Content Placeholder 2"/>
+          <p:cNvSpPr>
+            <a:spLocks noGrp="1"/>
+          </p:cNvSpPr>
+          <p:nvPr>
+            <p:ph idx="1"/>
+          </p:nvPr>
+        </p:nvSpPr>
+        <p:spPr/>
+        <p:txBody>
+          <a:bodyPr/>
+          <a:lstStyle/>
+          <a:p>
+            <a:endParaRPr lang="en-US" dirty="0"/>
+          </a:p>
+          <a:p>
+            <a:endParaRPr lang="en-US" dirty="0"/>
+          </a:p>
+          <a:p>
+            <a:endParaRPr lang="en-US" dirty="0"/>
+          </a:p>
+          <a:p>
+            <a:endParaRPr lang="en-US" dirty="0"/>
+          </a:p>
+          <a:p>
+            <a:endParaRPr lang="en-US" dirty="0"/>
+          </a:p>
+          <a:p>
+            <a:pPr>
+              <a:buNone/>
+            </a:pPr>
+            <a:r>
+              <a:rPr lang="en-US" dirty="0"/>
+              <a:t>			</a:t>
+            </a:r>
+            <a:r>
+              <a:rPr lang="en-US" sz="3200" dirty="0"/>
+              <a:t>	Questions?</a:t>
+            </a:r>
+            <a:endParaRPr lang="en-US" dirty="0"/>
+          </a:p>
+        </p:txBody>
+      </p:sp>
+    </p:spTree>
+  </p:cSld>
+  <p:clrMapOvr>
+    <a:masterClrMapping/>
+  </p:clrMapOvr>
+</p:sld>
+</file>
+
+<file path=ppt/slides/slide16.xml><?xml version="1.0" encoding="utf-8"?>
 <p:sld xmlns:a="http://schemas.openxmlformats.org/drawingml/2006/main" xmlns:r="http://schemas.openxmlformats.org/officeDocument/2006/relationships" xmlns:p="http://schemas.openxmlformats.org/presentationml/2006/main">
   <p:cSld>
     <p:bg>
@@ -10266,7 +10774,7 @@
         </p:nvGrpSpPr>
         <p:grpSpPr>
           <a:xfrm>
-            <a:off x="1600200" y="838200"/>
+            <a:off x="1283109" y="1743075"/>
             <a:ext cx="7848600" cy="2286000"/>
             <a:chOff x="1143000" y="4724400"/>
             <a:chExt cx="7848600" cy="2286000"/>
@@ -10495,7 +11003,7 @@
         </p:nvSpPr>
         <p:spPr>
           <a:xfrm>
-            <a:off x="501869" y="2785415"/>
+            <a:off x="501869" y="4000500"/>
             <a:ext cx="8229600" cy="1028700"/>
           </a:xfrm>
         </p:spPr>
@@ -10794,369 +11302,6 @@
             </a:fontRef>
           </p:style>
         </p:cxnSp>
-      </p:grpSp>
-      <p:sp>
-        <p:nvSpPr>
-          <p:cNvPr id="16" name="Content Placeholder 2"/>
-          <p:cNvSpPr txBox="1">
-            <a:spLocks/>
-          </p:cNvSpPr>
-          <p:nvPr/>
-        </p:nvSpPr>
-        <p:spPr>
-          <a:xfrm>
-            <a:off x="509752" y="5800223"/>
-            <a:ext cx="8229600" cy="463422"/>
-          </a:xfrm>
-          <a:prstGeom prst="rect">
-            <a:avLst/>
-          </a:prstGeom>
-        </p:spPr>
-        <p:txBody>
-          <a:bodyPr vert="horz" lIns="91432" tIns="45716" rIns="91432" bIns="45716" rtlCol="0">
-            <a:normAutofit/>
-          </a:bodyPr>
-          <a:lstStyle>
-            <a:lvl1pPr marL="342870" indent="-342870" algn="l" defTabSz="914318" rtl="0" eaLnBrk="1" latinLnBrk="0" hangingPunct="1">
-              <a:spcBef>
-                <a:spcPts val="0"/>
-              </a:spcBef>
-              <a:buFont typeface="Arial" pitchFamily="34" charset="0"/>
-              <a:buChar char="•"/>
-              <a:defRPr sz="2400" kern="1200">
-                <a:solidFill>
-                  <a:schemeClr val="tx1"/>
-                </a:solidFill>
-                <a:latin typeface="+mn-lt"/>
-                <a:ea typeface="+mn-ea"/>
-                <a:cs typeface="+mn-cs"/>
-              </a:defRPr>
-            </a:lvl1pPr>
-            <a:lvl2pPr marL="742883" indent="-285724" algn="l" defTabSz="914318" rtl="0" eaLnBrk="1" latinLnBrk="0" hangingPunct="1">
-              <a:spcBef>
-                <a:spcPts val="200"/>
-              </a:spcBef>
-              <a:buFont typeface="Arial" pitchFamily="34" charset="0"/>
-              <a:buChar char="–"/>
-              <a:defRPr sz="2200" kern="1200">
-                <a:solidFill>
-                  <a:schemeClr val="tx1"/>
-                </a:solidFill>
-                <a:latin typeface="+mn-lt"/>
-                <a:ea typeface="+mn-ea"/>
-                <a:cs typeface="+mn-cs"/>
-              </a:defRPr>
-            </a:lvl2pPr>
-            <a:lvl3pPr marL="1142898" indent="-228580" algn="l" defTabSz="914318" rtl="0" eaLnBrk="1" latinLnBrk="0" hangingPunct="1">
-              <a:spcBef>
-                <a:spcPts val="0"/>
-              </a:spcBef>
-              <a:buFont typeface="Arial" pitchFamily="34" charset="0"/>
-              <a:buChar char="•"/>
-              <a:defRPr sz="2200" kern="1200">
-                <a:solidFill>
-                  <a:schemeClr val="tx1"/>
-                </a:solidFill>
-                <a:latin typeface="+mn-lt"/>
-                <a:ea typeface="+mn-ea"/>
-                <a:cs typeface="+mn-cs"/>
-              </a:defRPr>
-            </a:lvl3pPr>
-            <a:lvl4pPr marL="1600057" indent="-228580" algn="l" defTabSz="914318" rtl="0" eaLnBrk="1" latinLnBrk="0" hangingPunct="1">
-              <a:spcBef>
-                <a:spcPts val="200"/>
-              </a:spcBef>
-              <a:buFont typeface="Arial" pitchFamily="34" charset="0"/>
-              <a:buChar char="–"/>
-              <a:defRPr sz="2000" kern="1200">
-                <a:solidFill>
-                  <a:schemeClr val="tx1"/>
-                </a:solidFill>
-                <a:latin typeface="+mn-lt"/>
-                <a:ea typeface="+mn-ea"/>
-                <a:cs typeface="+mn-cs"/>
-              </a:defRPr>
-            </a:lvl4pPr>
-            <a:lvl5pPr marL="2057217" indent="-228580" algn="l" defTabSz="914318" rtl="0" eaLnBrk="1" latinLnBrk="0" hangingPunct="1">
-              <a:spcBef>
-                <a:spcPts val="200"/>
-              </a:spcBef>
-              <a:buFont typeface="Arial" pitchFamily="34" charset="0"/>
-              <a:buChar char="»"/>
-              <a:defRPr sz="2000" kern="1200">
-                <a:solidFill>
-                  <a:schemeClr val="tx1"/>
-                </a:solidFill>
-                <a:latin typeface="+mn-lt"/>
-                <a:ea typeface="+mn-ea"/>
-                <a:cs typeface="+mn-cs"/>
-              </a:defRPr>
-            </a:lvl5pPr>
-            <a:lvl6pPr marL="2514376" indent="-228580" algn="l" defTabSz="914318" rtl="0" eaLnBrk="1" latinLnBrk="0" hangingPunct="1">
-              <a:spcBef>
-                <a:spcPct val="20000"/>
-              </a:spcBef>
-              <a:buFont typeface="Arial" pitchFamily="34" charset="0"/>
-              <a:buChar char="•"/>
-              <a:defRPr sz="2000" kern="1200">
-                <a:solidFill>
-                  <a:schemeClr val="tx1"/>
-                </a:solidFill>
-                <a:latin typeface="+mn-lt"/>
-                <a:ea typeface="+mn-ea"/>
-                <a:cs typeface="+mn-cs"/>
-              </a:defRPr>
-            </a:lvl6pPr>
-            <a:lvl7pPr marL="2971535" indent="-228580" algn="l" defTabSz="914318" rtl="0" eaLnBrk="1" latinLnBrk="0" hangingPunct="1">
-              <a:spcBef>
-                <a:spcPct val="20000"/>
-              </a:spcBef>
-              <a:buFont typeface="Arial" pitchFamily="34" charset="0"/>
-              <a:buChar char="•"/>
-              <a:defRPr sz="2000" kern="1200">
-                <a:solidFill>
-                  <a:schemeClr val="tx1"/>
-                </a:solidFill>
-                <a:latin typeface="+mn-lt"/>
-                <a:ea typeface="+mn-ea"/>
-                <a:cs typeface="+mn-cs"/>
-              </a:defRPr>
-            </a:lvl7pPr>
-            <a:lvl8pPr marL="3428695" indent="-228580" algn="l" defTabSz="914318" rtl="0" eaLnBrk="1" latinLnBrk="0" hangingPunct="1">
-              <a:spcBef>
-                <a:spcPct val="20000"/>
-              </a:spcBef>
-              <a:buFont typeface="Arial" pitchFamily="34" charset="0"/>
-              <a:buChar char="•"/>
-              <a:defRPr sz="2000" kern="1200">
-                <a:solidFill>
-                  <a:schemeClr val="tx1"/>
-                </a:solidFill>
-                <a:latin typeface="+mn-lt"/>
-                <a:ea typeface="+mn-ea"/>
-                <a:cs typeface="+mn-cs"/>
-              </a:defRPr>
-            </a:lvl8pPr>
-            <a:lvl9pPr marL="3885854" indent="-228580" algn="l" defTabSz="914318" rtl="0" eaLnBrk="1" latinLnBrk="0" hangingPunct="1">
-              <a:spcBef>
-                <a:spcPct val="20000"/>
-              </a:spcBef>
-              <a:buFont typeface="Arial" pitchFamily="34" charset="0"/>
-              <a:buChar char="•"/>
-              <a:defRPr sz="2000" kern="1200">
-                <a:solidFill>
-                  <a:schemeClr val="tx1"/>
-                </a:solidFill>
-                <a:latin typeface="+mn-lt"/>
-                <a:ea typeface="+mn-ea"/>
-                <a:cs typeface="+mn-cs"/>
-              </a:defRPr>
-            </a:lvl9pPr>
-          </a:lstStyle>
-          <a:p>
-            <a:r>
-              <a:rPr lang="en-US" sz="2000" dirty="0" smtClean="0"/>
-              <a:t>Revise trajectory if pedestrian moves outside </a:t>
-            </a:r>
-            <a:r>
-              <a:rPr lang="en-US" sz="2000" dirty="0" err="1" smtClean="0"/>
-              <a:t>replan</a:t>
-            </a:r>
-            <a:r>
-              <a:rPr lang="en-US" sz="2000" dirty="0" smtClean="0"/>
-              <a:t> buffer</a:t>
-            </a:r>
-          </a:p>
-          <a:p>
-            <a:endParaRPr lang="en-US" sz="2000" dirty="0" smtClean="0"/>
-          </a:p>
-          <a:p>
-            <a:endParaRPr lang="en-US" sz="2000" dirty="0" smtClean="0"/>
-          </a:p>
-          <a:p>
-            <a:endParaRPr lang="en-US" sz="2000" dirty="0" smtClean="0"/>
-          </a:p>
-          <a:p>
-            <a:endParaRPr lang="en-US" sz="2000" dirty="0" smtClean="0"/>
-          </a:p>
-          <a:p>
-            <a:endParaRPr lang="en-US" sz="2000" dirty="0" smtClean="0"/>
-          </a:p>
-          <a:p>
-            <a:endParaRPr lang="en-US" sz="2000" dirty="0" smtClean="0"/>
-          </a:p>
-          <a:p>
-            <a:endParaRPr lang="en-US" sz="2000" dirty="0" smtClean="0"/>
-          </a:p>
-          <a:p>
-            <a:pPr>
-              <a:buFont typeface="Arial" pitchFamily="34" charset="0"/>
-              <a:buNone/>
-            </a:pPr>
-            <a:endParaRPr lang="en-US" sz="2000" dirty="0" smtClean="0"/>
-          </a:p>
-          <a:p>
-            <a:pPr>
-              <a:buFont typeface="Arial" pitchFamily="34" charset="0"/>
-              <a:buNone/>
-            </a:pPr>
-            <a:endParaRPr lang="en-US" sz="2000" dirty="0"/>
-          </a:p>
-        </p:txBody>
-      </p:sp>
-      <p:grpSp>
-        <p:nvGrpSpPr>
-          <p:cNvPr id="23" name="Group 22"/>
-          <p:cNvGrpSpPr/>
-          <p:nvPr/>
-        </p:nvGrpSpPr>
-        <p:grpSpPr>
-          <a:xfrm>
-            <a:off x="661219" y="3733800"/>
-            <a:ext cx="6553200" cy="2057400"/>
-            <a:chOff x="838200" y="990600"/>
-            <a:chExt cx="6172200" cy="1783080"/>
-          </a:xfrm>
-        </p:grpSpPr>
-        <p:grpSp>
-          <p:nvGrpSpPr>
-            <p:cNvPr id="24" name="Group 7"/>
-            <p:cNvGrpSpPr/>
-            <p:nvPr/>
-          </p:nvGrpSpPr>
-          <p:grpSpPr>
-            <a:xfrm>
-              <a:off x="838200" y="990600"/>
-              <a:ext cx="6019800" cy="1719077"/>
-              <a:chOff x="990600" y="1447800"/>
-              <a:chExt cx="6019800" cy="1719077"/>
-            </a:xfrm>
-          </p:grpSpPr>
-          <p:pic>
-            <p:nvPicPr>
-              <p:cNvPr id="26" name="Picture 5"/>
-              <p:cNvPicPr>
-                <a:picLocks noChangeAspect="1" noChangeArrowheads="1"/>
-              </p:cNvPicPr>
-              <p:nvPr/>
-            </p:nvPicPr>
-            <p:blipFill>
-              <a:blip r:embed="rId4" cstate="print"/>
-              <a:srcRect/>
-              <a:stretch>
-                <a:fillRect/>
-              </a:stretch>
-            </p:blipFill>
-            <p:spPr bwMode="auto">
-              <a:xfrm>
-                <a:off x="1295400" y="1600200"/>
-                <a:ext cx="5715000" cy="1566677"/>
-              </a:xfrm>
-              <a:prstGeom prst="rect">
-                <a:avLst/>
-              </a:prstGeom>
-              <a:noFill/>
-              <a:ln w="9525">
-                <a:noFill/>
-                <a:miter lim="800000"/>
-                <a:headEnd/>
-                <a:tailEnd/>
-              </a:ln>
-            </p:spPr>
-          </p:pic>
-          <p:sp>
-            <p:nvSpPr>
-              <p:cNvPr id="27" name="Rectangle 26"/>
-              <p:cNvSpPr/>
-              <p:nvPr/>
-            </p:nvSpPr>
-            <p:spPr>
-              <a:xfrm>
-                <a:off x="990600" y="1447800"/>
-                <a:ext cx="914400" cy="1717040"/>
-              </a:xfrm>
-              <a:prstGeom prst="rect">
-                <a:avLst/>
-              </a:prstGeom>
-              <a:solidFill>
-                <a:schemeClr val="bg1"/>
-              </a:solidFill>
-              <a:ln>
-                <a:noFill/>
-              </a:ln>
-            </p:spPr>
-            <p:style>
-              <a:lnRef idx="2">
-                <a:schemeClr val="accent1">
-                  <a:shade val="50000"/>
-                </a:schemeClr>
-              </a:lnRef>
-              <a:fillRef idx="1">
-                <a:schemeClr val="accent1"/>
-              </a:fillRef>
-              <a:effectRef idx="0">
-                <a:schemeClr val="accent1"/>
-              </a:effectRef>
-              <a:fontRef idx="minor">
-                <a:schemeClr val="lt1"/>
-              </a:fontRef>
-            </p:style>
-            <p:txBody>
-              <a:bodyPr rtlCol="0" anchor="ctr"/>
-              <a:lstStyle/>
-              <a:p>
-                <a:pPr algn="ctr"/>
-                <a:endParaRPr lang="en-US"/>
-              </a:p>
-            </p:txBody>
-          </p:sp>
-        </p:grpSp>
-        <p:sp>
-          <p:nvSpPr>
-            <p:cNvPr id="25" name="Rectangle 24"/>
-            <p:cNvSpPr/>
-            <p:nvPr/>
-          </p:nvSpPr>
-          <p:spPr>
-            <a:xfrm>
-              <a:off x="1600200" y="2545080"/>
-              <a:ext cx="5410200" cy="228600"/>
-            </a:xfrm>
-            <a:prstGeom prst="rect">
-              <a:avLst/>
-            </a:prstGeom>
-            <a:solidFill>
-              <a:schemeClr val="bg1"/>
-            </a:solidFill>
-            <a:ln>
-              <a:noFill/>
-            </a:ln>
-          </p:spPr>
-          <p:style>
-            <a:lnRef idx="2">
-              <a:schemeClr val="accent1">
-                <a:shade val="50000"/>
-              </a:schemeClr>
-            </a:lnRef>
-            <a:fillRef idx="1">
-              <a:schemeClr val="accent1"/>
-            </a:fillRef>
-            <a:effectRef idx="0">
-              <a:schemeClr val="accent1"/>
-            </a:effectRef>
-            <a:fontRef idx="minor">
-              <a:schemeClr val="lt1"/>
-            </a:fontRef>
-          </p:style>
-          <p:txBody>
-            <a:bodyPr rtlCol="0" anchor="ctr"/>
-            <a:lstStyle/>
-            <a:p>
-              <a:pPr algn="ctr"/>
-              <a:endParaRPr lang="en-US"/>
-            </a:p>
-          </p:txBody>
-        </p:sp>
       </p:grpSp>
     </p:spTree>
   </p:cSld>

</xml_diff>